<commit_message>
Added project screenshot to README.md
</commit_message>
<xml_diff>
--- a/Project_Presentation.pptx
+++ b/Project_Presentation.pptx
@@ -53,7 +53,7 @@
       <p:boldItalic r:id="rId31"/>
     </p:embeddedFont>
     <p:embeddedFont>
-      <p:font typeface="Roboto" panose="020B0604020202020204" pitchFamily="2" charset="0"/>
+      <p:font typeface="Roboto" panose="02000000000000000000" pitchFamily="2" charset="0"/>
       <p:regular r:id="rId32"/>
       <p:bold r:id="rId33"/>
       <p:italic r:id="rId34"/>
@@ -403,7 +403,7 @@
           <a:p>
             <a:fld id="{61526798-42F7-47D7-A507-2FC2D437BC88}" type="datetimeFigureOut">
               <a:rPr lang="fr-FR" smtClean="0"/>
-              <a:t>18/12/2022</a:t>
+              <a:t>25/12/2022</a:t>
             </a:fld>
             <a:endParaRPr lang="fr-FR"/>
           </a:p>
@@ -17397,14 +17397,13 @@
         </p:nvPicPr>
         <p:blipFill>
           <a:blip r:embed="rId3"/>
-          <a:stretch>
-            <a:fillRect/>
-          </a:stretch>
+          <a:srcRect/>
+          <a:stretch/>
         </p:blipFill>
         <p:spPr>
           <a:xfrm>
-            <a:off x="4572000" y="0"/>
-            <a:ext cx="4572000" cy="3218214"/>
+            <a:off x="4578432" y="0"/>
+            <a:ext cx="4559136" cy="3218214"/>
           </a:xfrm>
           <a:prstGeom prst="rect">
             <a:avLst/>

</xml_diff>